<commit_message>
committing changes to maven slides (added more slides + screen shots etc)
</commit_message>
<xml_diff>
--- a/14-01 Studio Maven Support.pptx
+++ b/14-01 Studio Maven Support.pptx
@@ -6,19 +6,22 @@
     <p:sldMasterId id="2147483650" r:id="rId2"/>
   </p:sldMasterIdLst>
   <p:notesMasterIdLst>
-    <p:notesMasterId r:id="rId10"/>
+    <p:notesMasterId r:id="rId13"/>
   </p:notesMasterIdLst>
   <p:handoutMasterIdLst>
-    <p:handoutMasterId r:id="rId11"/>
+    <p:handoutMasterId r:id="rId14"/>
   </p:handoutMasterIdLst>
   <p:sldIdLst>
     <p:sldId id="308" r:id="rId3"/>
     <p:sldId id="315" r:id="rId4"/>
     <p:sldId id="316" r:id="rId5"/>
-    <p:sldId id="317" r:id="rId6"/>
-    <p:sldId id="318" r:id="rId7"/>
-    <p:sldId id="320" r:id="rId8"/>
-    <p:sldId id="321" r:id="rId9"/>
+    <p:sldId id="324" r:id="rId6"/>
+    <p:sldId id="317" r:id="rId7"/>
+    <p:sldId id="322" r:id="rId8"/>
+    <p:sldId id="318" r:id="rId9"/>
+    <p:sldId id="323" r:id="rId10"/>
+    <p:sldId id="320" r:id="rId11"/>
+    <p:sldId id="321" r:id="rId12"/>
   </p:sldIdLst>
   <p:sldSz cx="9144000" cy="6858000" type="screen4x3"/>
   <p:notesSz cx="6950075" cy="9236075"/>
@@ -7101,6 +7104,172 @@
 </p:sld>
 </file>
 
+<file path=ppt/slides/slide10.xml><?xml version="1.0" encoding="utf-8"?>
+<p:sld xmlns:a="http://schemas.openxmlformats.org/drawingml/2006/main" xmlns:r="http://schemas.openxmlformats.org/officeDocument/2006/relationships" xmlns:p="http://schemas.openxmlformats.org/presentationml/2006/main">
+  <p:cSld>
+    <p:spTree>
+      <p:nvGrpSpPr>
+        <p:cNvPr id="1" name=""/>
+        <p:cNvGrpSpPr/>
+        <p:nvPr/>
+      </p:nvGrpSpPr>
+      <p:grpSpPr>
+        <a:xfrm>
+          <a:off x="0" y="0"/>
+          <a:ext cx="0" cy="0"/>
+          <a:chOff x="0" y="0"/>
+          <a:chExt cx="0" cy="0"/>
+        </a:xfrm>
+      </p:grpSpPr>
+      <p:sp>
+        <p:nvSpPr>
+          <p:cNvPr id="2" name="Title 1"/>
+          <p:cNvSpPr>
+            <a:spLocks noGrp="1"/>
+          </p:cNvSpPr>
+          <p:nvPr>
+            <p:ph type="title"/>
+          </p:nvPr>
+        </p:nvSpPr>
+        <p:spPr/>
+        <p:txBody>
+          <a:bodyPr/>
+          <a:lstStyle/>
+          <a:p>
+            <a:r>
+              <a:rPr lang="en-US" dirty="0" smtClean="0"/>
+              <a:t>Studio Maven – Lab Primer</a:t>
+            </a:r>
+            <a:endParaRPr lang="en-US" dirty="0"/>
+          </a:p>
+        </p:txBody>
+      </p:sp>
+      <p:sp>
+        <p:nvSpPr>
+          <p:cNvPr id="3" name="Content Placeholder 2"/>
+          <p:cNvSpPr>
+            <a:spLocks noGrp="1"/>
+          </p:cNvSpPr>
+          <p:nvPr>
+            <p:ph idx="1"/>
+          </p:nvPr>
+        </p:nvSpPr>
+        <p:spPr/>
+        <p:txBody>
+          <a:bodyPr/>
+          <a:lstStyle/>
+          <a:p>
+            <a:r>
+              <a:rPr lang="en-US" dirty="0" smtClean="0"/>
+              <a:t>The aim of this lab is to add Maven support to the existing Lab project</a:t>
+            </a:r>
+          </a:p>
+          <a:p>
+            <a:r>
+              <a:rPr lang="en-US" dirty="0" smtClean="0"/>
+              <a:t>Add </a:t>
+            </a:r>
+            <a:r>
+              <a:rPr lang="en-US" dirty="0" err="1" smtClean="0"/>
+              <a:t>pom.xml</a:t>
+            </a:r>
+            <a:r>
+              <a:rPr lang="en-US" dirty="0" smtClean="0"/>
+              <a:t> and include required dependencies:</a:t>
+            </a:r>
+          </a:p>
+          <a:p>
+            <a:pPr lvl="1"/>
+            <a:r>
+              <a:rPr lang="en-US" dirty="0" smtClean="0"/>
+              <a:t>activemq-all-5.5.1</a:t>
+            </a:r>
+          </a:p>
+          <a:p>
+            <a:pPr lvl="1"/>
+            <a:r>
+              <a:rPr lang="en-US" dirty="0"/>
+              <a:t>d</a:t>
+            </a:r>
+            <a:r>
+              <a:rPr lang="en-US" dirty="0" smtClean="0"/>
+              <a:t>erby-10.6.1.0</a:t>
+            </a:r>
+          </a:p>
+          <a:p>
+            <a:pPr lvl="1"/>
+            <a:r>
+              <a:rPr lang="en-US" dirty="0"/>
+              <a:t>c</a:t>
+            </a:r>
+            <a:r>
+              <a:rPr lang="en-US" dirty="0" smtClean="0"/>
+              <a:t>ommons-collections-3.2.1</a:t>
+            </a:r>
+          </a:p>
+          <a:p>
+            <a:pPr lvl="1"/>
+            <a:r>
+              <a:rPr lang="en-US" dirty="0"/>
+              <a:t>c</a:t>
+            </a:r>
+            <a:r>
+              <a:rPr lang="en-US" dirty="0" smtClean="0"/>
+              <a:t>ommonse-lang-2.4</a:t>
+            </a:r>
+          </a:p>
+          <a:p>
+            <a:pPr lvl="1"/>
+            <a:endParaRPr lang="en-US" dirty="0"/>
+          </a:p>
+        </p:txBody>
+      </p:sp>
+      <p:sp>
+        <p:nvSpPr>
+          <p:cNvPr id="4" name="Footer Placeholder 3"/>
+          <p:cNvSpPr>
+            <a:spLocks noGrp="1"/>
+          </p:cNvSpPr>
+          <p:nvPr>
+            <p:ph type="ftr" sz="quarter" idx="10"/>
+          </p:nvPr>
+        </p:nvSpPr>
+        <p:spPr/>
+        <p:txBody>
+          <a:bodyPr/>
+          <a:lstStyle/>
+          <a:p>
+            <a:r>
+              <a:rPr lang="en-US" smtClean="0"/>
+              <a:t>All contents Copyright </a:t>
+            </a:r>
+            <a:r>
+              <a:rPr lang="en-US" smtClean="0">
+                <a:sym typeface="Symbol" pitchFamily="18" charset="2"/>
+              </a:rPr>
+              <a:t></a:t>
+            </a:r>
+            <a:r>
+              <a:rPr lang="en-US" smtClean="0"/>
+              <a:t> 2011, MuleSoft Inc.</a:t>
+            </a:r>
+            <a:endParaRPr lang="en-US"/>
+          </a:p>
+        </p:txBody>
+      </p:sp>
+    </p:spTree>
+    <p:extLst>
+      <p:ext uri="{BB962C8B-B14F-4D97-AF65-F5344CB8AC3E}">
+        <p14:creationId xmlns:p14="http://schemas.microsoft.com/office/powerpoint/2010/main" val="764660959"/>
+      </p:ext>
+    </p:extLst>
+  </p:cSld>
+  <p:clrMapOvr>
+    <a:masterClrMapping/>
+  </p:clrMapOvr>
+</p:sld>
+</file>
+
 <file path=ppt/slides/slide2.xml><?xml version="1.0" encoding="utf-8"?>
 <p:sld xmlns:a="http://schemas.openxmlformats.org/drawingml/2006/main" xmlns:r="http://schemas.openxmlformats.org/officeDocument/2006/relationships" xmlns:p="http://schemas.openxmlformats.org/presentationml/2006/main">
   <p:cSld>
@@ -7197,28 +7366,51 @@
             </a:r>
           </a:p>
           <a:p>
-            <a:endParaRPr lang="en-US" dirty="0"/>
-          </a:p>
-          <a:p>
             <a:r>
               <a:rPr lang="en-US" dirty="0" smtClean="0"/>
-              <a:t>Convert Maven project to Mule Studio project</a:t>
-            </a:r>
-          </a:p>
-          <a:p>
-            <a:pPr marL="0" indent="0">
-              <a:buNone/>
-            </a:pPr>
-            <a:endParaRPr lang="en-US" dirty="0"/>
-          </a:p>
-          <a:p>
+              <a:t>Convert </a:t>
+            </a:r>
             <a:r>
               <a:rPr lang="en-US" dirty="0" smtClean="0"/>
-              <a:t>Convert Mule Studio project to use Maven</a:t>
-            </a:r>
-          </a:p>
-        </p:txBody>
-      </p:sp>
+              <a:t>Maven project to Mule Studio project</a:t>
+            </a:r>
+          </a:p>
+          <a:p>
+            <a:r>
+              <a:rPr lang="en-US" dirty="0" smtClean="0"/>
+              <a:t>Convert </a:t>
+            </a:r>
+            <a:r>
+              <a:rPr lang="en-US" dirty="0" smtClean="0"/>
+              <a:t>Mule Studio project to use Maven</a:t>
+            </a:r>
+          </a:p>
+        </p:txBody>
+      </p:sp>
+      <p:pic>
+        <p:nvPicPr>
+          <p:cNvPr id="2" name="Picture 1"/>
+          <p:cNvPicPr>
+            <a:picLocks noChangeAspect="1"/>
+          </p:cNvPicPr>
+          <p:nvPr/>
+        </p:nvPicPr>
+        <p:blipFill>
+          <a:blip r:embed="rId3"/>
+          <a:stretch>
+            <a:fillRect/>
+          </a:stretch>
+        </p:blipFill>
+        <p:spPr>
+          <a:xfrm>
+            <a:off x="1828800" y="2590800"/>
+            <a:ext cx="5715000" cy="3481470"/>
+          </a:xfrm>
+          <a:prstGeom prst="rect">
+            <a:avLst/>
+          </a:prstGeom>
+        </p:spPr>
+      </p:pic>
     </p:spTree>
   </p:cSld>
   <p:clrMapOvr>
@@ -7339,7 +7531,11 @@
             <a:pPr lvl="1"/>
             <a:r>
               <a:rPr lang="en-US" dirty="0" smtClean="0"/>
-              <a:t>populate_m2_repo script is run</a:t>
+              <a:t>populate_m2_repo script is </a:t>
+            </a:r>
+            <a:r>
+              <a:rPr lang="en-US" dirty="0" smtClean="0"/>
+              <a:t>run</a:t>
             </a:r>
             <a:endParaRPr lang="en-US" dirty="0" smtClean="0"/>
           </a:p>
@@ -7349,24 +7545,36 @@
           <a:p>
             <a:r>
               <a:rPr lang="en-US" dirty="0" smtClean="0"/>
-              <a:t>One may turn on/off Maven support for a project</a:t>
+              <a:t>One </a:t>
+            </a:r>
+            <a:r>
+              <a:rPr lang="en-US" dirty="0" smtClean="0"/>
+              <a:t>may turn on/off Maven support for a project</a:t>
             </a:r>
           </a:p>
           <a:p>
             <a:pPr lvl="1"/>
             <a:r>
               <a:rPr lang="en-US" dirty="0" smtClean="0"/>
-              <a:t>Maven support does not change behavior</a:t>
-            </a:r>
-            <a:endParaRPr lang="en-US" dirty="0"/>
-          </a:p>
-          <a:p>
+              <a:t>Maven support does not change </a:t>
+            </a:r>
+            <a:r>
+              <a:rPr lang="en-US" dirty="0" smtClean="0"/>
+              <a:t>behavior</a:t>
+            </a:r>
             <a:endParaRPr lang="en-US" dirty="0" smtClean="0"/>
           </a:p>
           <a:p>
+            <a:endParaRPr lang="en-US" dirty="0" smtClean="0"/>
+          </a:p>
+          <a:p>
             <a:r>
               <a:rPr lang="en-US" dirty="0" smtClean="0"/>
-              <a:t>When updating project dependencies, the </a:t>
+              <a:t>When </a:t>
+            </a:r>
+            <a:r>
+              <a:rPr lang="en-US" dirty="0" smtClean="0"/>
+              <a:t>updating project dependencies, the </a:t>
             </a:r>
             <a:r>
               <a:rPr lang="en-US" dirty="0" err="1" smtClean="0"/>
@@ -7374,21 +7582,39 @@
             </a:r>
             <a:r>
               <a:rPr lang="en-US" dirty="0" smtClean="0"/>
-              <a:t> is updated</a:t>
+              <a:t> is </a:t>
+            </a:r>
+            <a:r>
+              <a:rPr lang="en-US" dirty="0" smtClean="0"/>
+              <a:t>updated</a:t>
             </a:r>
             <a:endParaRPr lang="en-US" dirty="0" smtClean="0"/>
           </a:p>
           <a:p>
-            <a:pPr marL="457200" lvl="1" indent="0">
-              <a:buNone/>
-            </a:pPr>
             <a:endParaRPr lang="en-US" dirty="0" smtClean="0"/>
           </a:p>
           <a:p>
-            <a:pPr marL="457200" lvl="1" indent="0">
-              <a:buNone/>
-            </a:pPr>
-            <a:endParaRPr lang="en-US" dirty="0" smtClean="0"/>
+            <a:r>
+              <a:rPr lang="en-US" dirty="0" smtClean="0"/>
+              <a:t>By dragging a </a:t>
+            </a:r>
+            <a:r>
+              <a:rPr lang="en-US" dirty="0"/>
+              <a:t>component into the canvas, Mule updates the </a:t>
+            </a:r>
+            <a:r>
+              <a:rPr lang="en-US" dirty="0" err="1"/>
+              <a:t>pom.xml</a:t>
+            </a:r>
+            <a:r>
+              <a:rPr lang="en-US" dirty="0"/>
+              <a:t> file automatically with all </a:t>
+            </a:r>
+            <a:r>
+              <a:rPr lang="en-US" dirty="0" smtClean="0"/>
+              <a:t>required dependencies</a:t>
+            </a:r>
+            <a:endParaRPr lang="en-US" dirty="0"/>
           </a:p>
           <a:p>
             <a:endParaRPr lang="en-US" dirty="0"/>
@@ -7449,7 +7675,7 @@
           <a:p>
             <a:r>
               <a:rPr lang="en-US" dirty="0" smtClean="0"/>
-              <a:t>Troubleshooting Maven issues in Studio</a:t>
+              <a:t>Deploying Mule-Maven Projects</a:t>
             </a:r>
             <a:endParaRPr lang="en-US" dirty="0"/>
           </a:p>
@@ -7471,51 +7697,54 @@
           <a:lstStyle/>
           <a:p>
             <a:r>
+              <a:rPr lang="en-US" dirty="0" err="1"/>
+              <a:t>mvn</a:t>
+            </a:r>
+            <a:r>
+              <a:rPr lang="en-US" dirty="0"/>
+              <a:t> </a:t>
+            </a:r>
+            <a:r>
               <a:rPr lang="en-US" dirty="0" smtClean="0"/>
-              <a:t>What to do when Studio cannot find dependencies?</a:t>
-            </a:r>
-          </a:p>
-          <a:p>
-            <a:endParaRPr lang="en-US" dirty="0"/>
-          </a:p>
-          <a:p>
+              <a:t>package </a:t>
+            </a:r>
+          </a:p>
+          <a:p>
+            <a:pPr lvl="1"/>
             <a:r>
               <a:rPr lang="en-US" dirty="0" smtClean="0"/>
-              <a:t>If initial script is interrupted, then Mule dependencies are not installed properly</a:t>
-            </a:r>
-          </a:p>
-          <a:p>
-            <a:endParaRPr lang="en-US" dirty="0" smtClean="0"/>
-          </a:p>
-          <a:p>
+              <a:t>Mule packages </a:t>
+            </a:r>
+            <a:r>
+              <a:rPr lang="en-US" dirty="0"/>
+              <a:t>the project in a .zip </a:t>
+            </a:r>
             <a:r>
               <a:rPr lang="en-US" dirty="0" smtClean="0"/>
-              <a:t>Update dependencies</a:t>
-            </a:r>
-            <a:endParaRPr lang="en-US" dirty="0"/>
+              <a:t>file inside the target folder</a:t>
+            </a:r>
           </a:p>
           <a:p>
             <a:pPr lvl="1"/>
             <a:r>
               <a:rPr lang="en-US" dirty="0" smtClean="0"/>
-              <a:t>R. click on project -&gt; update studio dependencies</a:t>
-            </a:r>
-          </a:p>
-          <a:p>
-            <a:pPr lvl="1"/>
+              <a:t>deploy </a:t>
+            </a:r>
+            <a:r>
+              <a:rPr lang="en-US" dirty="0"/>
+              <a:t>the .zip file </a:t>
+            </a:r>
             <a:r>
               <a:rPr lang="en-US" dirty="0" smtClean="0"/>
-              <a:t>Use command line to update dependencies</a:t>
-            </a:r>
-          </a:p>
-          <a:p>
-            <a:pPr lvl="1"/>
-            <a:endParaRPr lang="en-US" dirty="0"/>
-          </a:p>
-          <a:p>
+              <a:t>from the target </a:t>
+            </a:r>
+            <a:r>
+              <a:rPr lang="en-US" dirty="0"/>
+              <a:t>folder to your Mule </a:t>
+            </a:r>
             <a:r>
               <a:rPr lang="en-US" dirty="0" smtClean="0"/>
-              <a:t>Manually remove problematic dependency from repo; this forces maven to download again</a:t>
+              <a:t>ESB to run the app</a:t>
             </a:r>
             <a:endParaRPr lang="en-US" dirty="0"/>
           </a:p>
@@ -7554,10 +7783,58 @@
           </a:p>
         </p:txBody>
       </p:sp>
+      <p:pic>
+        <p:nvPicPr>
+          <p:cNvPr id="6" name="Picture 5"/>
+          <p:cNvPicPr>
+            <a:picLocks noChangeAspect="1"/>
+          </p:cNvPicPr>
+          <p:nvPr/>
+        </p:nvPicPr>
+        <p:blipFill>
+          <a:blip r:embed="rId2"/>
+          <a:stretch>
+            <a:fillRect/>
+          </a:stretch>
+        </p:blipFill>
+        <p:spPr>
+          <a:xfrm>
+            <a:off x="5486400" y="3429000"/>
+            <a:ext cx="3352800" cy="2280684"/>
+          </a:xfrm>
+          <a:prstGeom prst="rect">
+            <a:avLst/>
+          </a:prstGeom>
+        </p:spPr>
+      </p:pic>
+      <p:pic>
+        <p:nvPicPr>
+          <p:cNvPr id="7" name="Picture 6"/>
+          <p:cNvPicPr>
+            <a:picLocks noChangeAspect="1"/>
+          </p:cNvPicPr>
+          <p:nvPr/>
+        </p:nvPicPr>
+        <p:blipFill>
+          <a:blip r:embed="rId3"/>
+          <a:stretch>
+            <a:fillRect/>
+          </a:stretch>
+        </p:blipFill>
+        <p:spPr>
+          <a:xfrm>
+            <a:off x="152400" y="3487220"/>
+            <a:ext cx="4953000" cy="1780854"/>
+          </a:xfrm>
+          <a:prstGeom prst="rect">
+            <a:avLst/>
+          </a:prstGeom>
+        </p:spPr>
+      </p:pic>
     </p:spTree>
     <p:extLst>
       <p:ext uri="{BB962C8B-B14F-4D97-AF65-F5344CB8AC3E}">
-        <p14:creationId xmlns:p14="http://schemas.microsoft.com/office/powerpoint/2010/main" val="1042877885"/>
+        <p14:creationId xmlns:p14="http://schemas.microsoft.com/office/powerpoint/2010/main" val="3205447168"/>
       </p:ext>
     </p:extLst>
   </p:cSld>
@@ -7601,7 +7878,7 @@
           <a:p>
             <a:r>
               <a:rPr lang="en-US" dirty="0" smtClean="0"/>
-              <a:t>Known Issues</a:t>
+              <a:t>Troubleshooting Maven issues in Studio</a:t>
             </a:r>
             <a:endParaRPr lang="en-US" dirty="0"/>
           </a:p>
@@ -7624,8 +7901,438 @@
           <a:p>
             <a:r>
               <a:rPr lang="en-US" dirty="0" smtClean="0"/>
-              <a:t>Maven-Mule-Plugin issue</a:t>
-            </a:r>
+              <a:t>What to do when Studio cannot find dependencies?</a:t>
+            </a:r>
+          </a:p>
+          <a:p>
+            <a:endParaRPr lang="en-US" dirty="0"/>
+          </a:p>
+          <a:p>
+            <a:r>
+              <a:rPr lang="en-US" dirty="0" smtClean="0"/>
+              <a:t>If initial script is interrupted, then Mule dependencies are not installed properly</a:t>
+            </a:r>
+          </a:p>
+          <a:p>
+            <a:endParaRPr lang="en-US" dirty="0" smtClean="0"/>
+          </a:p>
+          <a:p>
+            <a:r>
+              <a:rPr lang="en-US" dirty="0" smtClean="0"/>
+              <a:t>Update dependencies</a:t>
+            </a:r>
+            <a:endParaRPr lang="en-US" dirty="0"/>
+          </a:p>
+          <a:p>
+            <a:pPr lvl="1"/>
+            <a:r>
+              <a:rPr lang="en-US" dirty="0" smtClean="0"/>
+              <a:t>R. click on project -&gt; update studio dependencies</a:t>
+            </a:r>
+          </a:p>
+          <a:p>
+            <a:pPr lvl="1"/>
+            <a:r>
+              <a:rPr lang="en-US" dirty="0" smtClean="0"/>
+              <a:t>Use command line to update dependencies</a:t>
+            </a:r>
+          </a:p>
+          <a:p>
+            <a:pPr lvl="1"/>
+            <a:endParaRPr lang="en-US" dirty="0"/>
+          </a:p>
+        </p:txBody>
+      </p:sp>
+      <p:sp>
+        <p:nvSpPr>
+          <p:cNvPr id="4" name="Footer Placeholder 3"/>
+          <p:cNvSpPr>
+            <a:spLocks noGrp="1"/>
+          </p:cNvSpPr>
+          <p:nvPr>
+            <p:ph type="ftr" sz="quarter" idx="10"/>
+          </p:nvPr>
+        </p:nvSpPr>
+        <p:spPr/>
+        <p:txBody>
+          <a:bodyPr/>
+          <a:lstStyle/>
+          <a:p>
+            <a:r>
+              <a:rPr lang="en-US" smtClean="0"/>
+              <a:t>All contents Copyright </a:t>
+            </a:r>
+            <a:r>
+              <a:rPr lang="en-US" smtClean="0">
+                <a:sym typeface="Symbol" pitchFamily="18" charset="2"/>
+              </a:rPr>
+              <a:t></a:t>
+            </a:r>
+            <a:r>
+              <a:rPr lang="en-US" smtClean="0"/>
+              <a:t> 2011, MuleSoft Inc.</a:t>
+            </a:r>
+            <a:endParaRPr lang="en-US"/>
+          </a:p>
+        </p:txBody>
+      </p:sp>
+    </p:spTree>
+    <p:extLst>
+      <p:ext uri="{BB962C8B-B14F-4D97-AF65-F5344CB8AC3E}">
+        <p14:creationId xmlns:p14="http://schemas.microsoft.com/office/powerpoint/2010/main" val="1042877885"/>
+      </p:ext>
+    </p:extLst>
+  </p:cSld>
+  <p:clrMapOvr>
+    <a:masterClrMapping/>
+  </p:clrMapOvr>
+</p:sld>
+</file>
+
+<file path=ppt/slides/slide6.xml><?xml version="1.0" encoding="utf-8"?>
+<p:sld xmlns:a="http://schemas.openxmlformats.org/drawingml/2006/main" xmlns:r="http://schemas.openxmlformats.org/officeDocument/2006/relationships" xmlns:p="http://schemas.openxmlformats.org/presentationml/2006/main">
+  <p:cSld>
+    <p:spTree>
+      <p:nvGrpSpPr>
+        <p:cNvPr id="1" name=""/>
+        <p:cNvGrpSpPr/>
+        <p:nvPr/>
+      </p:nvGrpSpPr>
+      <p:grpSpPr>
+        <a:xfrm>
+          <a:off x="0" y="0"/>
+          <a:ext cx="0" cy="0"/>
+          <a:chOff x="0" y="0"/>
+          <a:chExt cx="0" cy="0"/>
+        </a:xfrm>
+      </p:grpSpPr>
+      <p:sp>
+        <p:nvSpPr>
+          <p:cNvPr id="2" name="Title 1"/>
+          <p:cNvSpPr>
+            <a:spLocks noGrp="1"/>
+          </p:cNvSpPr>
+          <p:nvPr>
+            <p:ph type="title"/>
+          </p:nvPr>
+        </p:nvSpPr>
+        <p:spPr/>
+        <p:txBody>
+          <a:bodyPr/>
+          <a:lstStyle/>
+          <a:p>
+            <a:r>
+              <a:rPr lang="en-US" dirty="0" smtClean="0"/>
+              <a:t>Fixing Dependency Issues Manually</a:t>
+            </a:r>
+            <a:endParaRPr lang="en-US" dirty="0"/>
+          </a:p>
+        </p:txBody>
+      </p:sp>
+      <p:sp>
+        <p:nvSpPr>
+          <p:cNvPr id="3" name="Content Placeholder 2"/>
+          <p:cNvSpPr>
+            <a:spLocks noGrp="1"/>
+          </p:cNvSpPr>
+          <p:nvPr>
+            <p:ph idx="1"/>
+          </p:nvPr>
+        </p:nvSpPr>
+        <p:spPr/>
+        <p:txBody>
+          <a:bodyPr/>
+          <a:lstStyle/>
+          <a:p>
+            <a:r>
+              <a:rPr lang="en-US" dirty="0" smtClean="0"/>
+              <a:t>1) Locate your project in workspace</a:t>
+            </a:r>
+          </a:p>
+          <a:p>
+            <a:pPr lvl="1"/>
+            <a:r>
+              <a:rPr lang="en-US" dirty="0" smtClean="0"/>
+              <a:t>Run ‘</a:t>
+            </a:r>
+            <a:r>
+              <a:rPr lang="en-US" dirty="0" err="1" smtClean="0"/>
+              <a:t>mvn</a:t>
+            </a:r>
+            <a:r>
+              <a:rPr lang="en-US" dirty="0" smtClean="0"/>
+              <a:t> </a:t>
+            </a:r>
+            <a:r>
+              <a:rPr lang="en-US" dirty="0" err="1" smtClean="0"/>
+              <a:t>studio:studio</a:t>
+            </a:r>
+            <a:r>
+              <a:rPr lang="en-US" dirty="0" smtClean="0"/>
+              <a:t>’</a:t>
+            </a:r>
+          </a:p>
+          <a:p>
+            <a:pPr lvl="1"/>
+            <a:endParaRPr lang="en-US" dirty="0" smtClean="0"/>
+          </a:p>
+          <a:p>
+            <a:r>
+              <a:rPr lang="en-US" dirty="0" smtClean="0"/>
+              <a:t>2) Manually install missing dependencies, example:</a:t>
+            </a:r>
+            <a:endParaRPr lang="en-US" dirty="0"/>
+          </a:p>
+          <a:p>
+            <a:pPr lvl="1"/>
+            <a:r>
+              <a:rPr lang="en-US" dirty="0" err="1"/>
+              <a:t>mvn</a:t>
+            </a:r>
+            <a:r>
+              <a:rPr lang="en-US" dirty="0"/>
+              <a:t> </a:t>
+            </a:r>
+            <a:r>
+              <a:rPr lang="en-US" dirty="0" err="1"/>
+              <a:t>install:install-file</a:t>
+            </a:r>
+            <a:r>
+              <a:rPr lang="en-US" dirty="0"/>
+              <a:t> -</a:t>
+            </a:r>
+            <a:r>
+              <a:rPr lang="en-US" dirty="0" err="1"/>
+              <a:t>DgroupId</a:t>
+            </a:r>
+            <a:r>
+              <a:rPr lang="en-US" dirty="0"/>
+              <a:t>=</a:t>
+            </a:r>
+            <a:r>
+              <a:rPr lang="en-US" dirty="0" err="1"/>
+              <a:t>com.mulesoft.muleesb.modules</a:t>
+            </a:r>
+            <a:r>
+              <a:rPr lang="en-US" dirty="0"/>
+              <a:t> -</a:t>
+            </a:r>
+            <a:r>
+              <a:rPr lang="en-US" dirty="0" err="1"/>
+              <a:t>DartifactId</a:t>
+            </a:r>
+            <a:r>
+              <a:rPr lang="en-US" dirty="0"/>
+              <a:t>=mule-module-plugin-</a:t>
+            </a:r>
+            <a:r>
+              <a:rPr lang="en-US" dirty="0" err="1"/>
+              <a:t>ee</a:t>
+            </a:r>
+            <a:r>
+              <a:rPr lang="en-US" dirty="0"/>
+              <a:t> -</a:t>
+            </a:r>
+            <a:r>
+              <a:rPr lang="en-US" dirty="0" err="1"/>
+              <a:t>Dpackaging</a:t>
+            </a:r>
+            <a:r>
+              <a:rPr lang="en-US" dirty="0"/>
+              <a:t>=jar -</a:t>
+            </a:r>
+            <a:r>
+              <a:rPr lang="en-US" dirty="0" err="1"/>
+              <a:t>Dversion</a:t>
+            </a:r>
+            <a:r>
+              <a:rPr lang="en-US" dirty="0"/>
+              <a:t>=3.4.0 -</a:t>
+            </a:r>
+            <a:r>
+              <a:rPr lang="en-US" dirty="0" err="1"/>
+              <a:t>Dfile</a:t>
+            </a:r>
+            <a:r>
+              <a:rPr lang="en-US" dirty="0"/>
+              <a:t>=mule-module-plugin-ee-3.4.0.jar -</a:t>
+            </a:r>
+            <a:r>
+              <a:rPr lang="en-US" dirty="0" err="1"/>
+              <a:t>DgeneratePom</a:t>
+            </a:r>
+            <a:r>
+              <a:rPr lang="en-US" dirty="0"/>
+              <a:t>=</a:t>
+            </a:r>
+            <a:r>
+              <a:rPr lang="en-US" dirty="0" smtClean="0"/>
+              <a:t>true</a:t>
+            </a:r>
+          </a:p>
+          <a:p>
+            <a:pPr lvl="1"/>
+            <a:endParaRPr lang="en-US" dirty="0"/>
+          </a:p>
+          <a:p>
+            <a:r>
+              <a:rPr lang="en-US" dirty="0" smtClean="0"/>
+              <a:t>3) Run populate_m2_repo script from standalone</a:t>
+            </a:r>
+            <a:endParaRPr lang="en-US" dirty="0"/>
+          </a:p>
+          <a:p>
+            <a:pPr lvl="1"/>
+            <a:r>
+              <a:rPr lang="en-US" dirty="0" smtClean="0"/>
+              <a:t>MULE_HOME/bin/</a:t>
+            </a:r>
+            <a:r>
+              <a:rPr lang="en-US" dirty="0"/>
+              <a:t>populate_m2_repo ~/.m2/repository</a:t>
+            </a:r>
+            <a:r>
+              <a:rPr lang="en-US" dirty="0" smtClean="0"/>
+              <a:t>/</a:t>
+            </a:r>
+          </a:p>
+          <a:p>
+            <a:pPr lvl="1"/>
+            <a:endParaRPr lang="en-US" dirty="0" smtClean="0"/>
+          </a:p>
+          <a:p>
+            <a:r>
+              <a:rPr lang="en-US" dirty="0"/>
+              <a:t>4</a:t>
+            </a:r>
+            <a:r>
+              <a:rPr lang="en-US" dirty="0" smtClean="0"/>
+              <a:t>) Manually </a:t>
+            </a:r>
+            <a:r>
+              <a:rPr lang="en-US" dirty="0"/>
+              <a:t>remove problematic dependency from </a:t>
+            </a:r>
+            <a:r>
+              <a:rPr lang="en-US" dirty="0" smtClean="0"/>
+              <a:t>repo and try to re-install</a:t>
+            </a:r>
+            <a:endParaRPr lang="en-US" dirty="0"/>
+          </a:p>
+        </p:txBody>
+      </p:sp>
+      <p:sp>
+        <p:nvSpPr>
+          <p:cNvPr id="4" name="Footer Placeholder 3"/>
+          <p:cNvSpPr>
+            <a:spLocks noGrp="1"/>
+          </p:cNvSpPr>
+          <p:nvPr>
+            <p:ph type="ftr" sz="quarter" idx="10"/>
+          </p:nvPr>
+        </p:nvSpPr>
+        <p:spPr/>
+        <p:txBody>
+          <a:bodyPr/>
+          <a:lstStyle/>
+          <a:p>
+            <a:r>
+              <a:rPr lang="en-US" smtClean="0"/>
+              <a:t>All contents Copyright </a:t>
+            </a:r>
+            <a:r>
+              <a:rPr lang="en-US" smtClean="0">
+                <a:sym typeface="Symbol" pitchFamily="18" charset="2"/>
+              </a:rPr>
+              <a:t></a:t>
+            </a:r>
+            <a:r>
+              <a:rPr lang="en-US" smtClean="0"/>
+              <a:t> 2011, MuleSoft Inc.</a:t>
+            </a:r>
+            <a:endParaRPr lang="en-US"/>
+          </a:p>
+        </p:txBody>
+      </p:sp>
+    </p:spTree>
+    <p:extLst>
+      <p:ext uri="{BB962C8B-B14F-4D97-AF65-F5344CB8AC3E}">
+        <p14:creationId xmlns:p14="http://schemas.microsoft.com/office/powerpoint/2010/main" val="1627882525"/>
+      </p:ext>
+    </p:extLst>
+  </p:cSld>
+  <p:clrMapOvr>
+    <a:masterClrMapping/>
+  </p:clrMapOvr>
+</p:sld>
+</file>
+
+<file path=ppt/slides/slide7.xml><?xml version="1.0" encoding="utf-8"?>
+<p:sld xmlns:a="http://schemas.openxmlformats.org/drawingml/2006/main" xmlns:r="http://schemas.openxmlformats.org/officeDocument/2006/relationships" xmlns:p="http://schemas.openxmlformats.org/presentationml/2006/main">
+  <p:cSld>
+    <p:spTree>
+      <p:nvGrpSpPr>
+        <p:cNvPr id="1" name=""/>
+        <p:cNvGrpSpPr/>
+        <p:nvPr/>
+      </p:nvGrpSpPr>
+      <p:grpSpPr>
+        <a:xfrm>
+          <a:off x="0" y="0"/>
+          <a:ext cx="0" cy="0"/>
+          <a:chOff x="0" y="0"/>
+          <a:chExt cx="0" cy="0"/>
+        </a:xfrm>
+      </p:grpSpPr>
+      <p:sp>
+        <p:nvSpPr>
+          <p:cNvPr id="2" name="Title 1"/>
+          <p:cNvSpPr>
+            <a:spLocks noGrp="1"/>
+          </p:cNvSpPr>
+          <p:nvPr>
+            <p:ph type="title"/>
+          </p:nvPr>
+        </p:nvSpPr>
+        <p:spPr/>
+        <p:txBody>
+          <a:bodyPr/>
+          <a:lstStyle/>
+          <a:p>
+            <a:r>
+              <a:rPr lang="en-US" dirty="0" smtClean="0"/>
+              <a:t>Known Issues</a:t>
+            </a:r>
+            <a:endParaRPr lang="en-US" dirty="0"/>
+          </a:p>
+        </p:txBody>
+      </p:sp>
+      <p:sp>
+        <p:nvSpPr>
+          <p:cNvPr id="3" name="Content Placeholder 2"/>
+          <p:cNvSpPr>
+            <a:spLocks noGrp="1"/>
+          </p:cNvSpPr>
+          <p:nvPr>
+            <p:ph idx="1"/>
+          </p:nvPr>
+        </p:nvSpPr>
+        <p:spPr/>
+        <p:txBody>
+          <a:bodyPr/>
+          <a:lstStyle/>
+          <a:p>
+            <a:r>
+              <a:rPr lang="en-US" dirty="0" smtClean="0"/>
+              <a:t>Maven-Mule-Plugin </a:t>
+            </a:r>
+            <a:r>
+              <a:rPr lang="en-US" dirty="0" smtClean="0"/>
+              <a:t>issue</a:t>
+            </a:r>
+          </a:p>
+          <a:p>
+            <a:endParaRPr lang="en-US" dirty="0" smtClean="0"/>
           </a:p>
           <a:p>
             <a:pPr lvl="1"/>
@@ -7652,14 +8359,26 @@
           </a:p>
           <a:p>
             <a:pPr lvl="1"/>
+            <a:endParaRPr lang="en-US" dirty="0" smtClean="0"/>
+          </a:p>
+          <a:p>
+            <a:pPr lvl="1"/>
             <a:r>
               <a:rPr lang="en-US" dirty="0" smtClean="0"/>
-              <a:t>Now, with Maven support, Studio does not know which dependencies belong to the same plugin for example</a:t>
+              <a:t>Now, with Maven support, Studio does not know which dependencies belong to the same plugin for </a:t>
+            </a:r>
+            <a:r>
+              <a:rPr lang="en-US" dirty="0" smtClean="0"/>
+              <a:t>example</a:t>
             </a:r>
           </a:p>
           <a:p>
             <a:pPr lvl="1"/>
             <a:endParaRPr lang="en-US" dirty="0"/>
+          </a:p>
+          <a:p>
+            <a:pPr lvl="1"/>
+            <a:endParaRPr lang="en-US" dirty="0" smtClean="0"/>
           </a:p>
         </p:txBody>
       </p:sp>
@@ -7709,7 +8428,164 @@
 </p:sld>
 </file>
 
-<file path=ppt/slides/slide6.xml><?xml version="1.0" encoding="utf-8"?>
+<file path=ppt/slides/slide8.xml><?xml version="1.0" encoding="utf-8"?>
+<p:sld xmlns:a="http://schemas.openxmlformats.org/drawingml/2006/main" xmlns:r="http://schemas.openxmlformats.org/officeDocument/2006/relationships" xmlns:p="http://schemas.openxmlformats.org/presentationml/2006/main">
+  <p:cSld>
+    <p:spTree>
+      <p:nvGrpSpPr>
+        <p:cNvPr id="1" name=""/>
+        <p:cNvGrpSpPr/>
+        <p:nvPr/>
+      </p:nvGrpSpPr>
+      <p:grpSpPr>
+        <a:xfrm>
+          <a:off x="0" y="0"/>
+          <a:ext cx="0" cy="0"/>
+          <a:chOff x="0" y="0"/>
+          <a:chExt cx="0" cy="0"/>
+        </a:xfrm>
+      </p:grpSpPr>
+      <p:sp>
+        <p:nvSpPr>
+          <p:cNvPr id="2" name="Title 1"/>
+          <p:cNvSpPr>
+            <a:spLocks noGrp="1"/>
+          </p:cNvSpPr>
+          <p:nvPr>
+            <p:ph type="title"/>
+          </p:nvPr>
+        </p:nvSpPr>
+        <p:spPr/>
+        <p:txBody>
+          <a:bodyPr/>
+          <a:lstStyle/>
+          <a:p>
+            <a:r>
+              <a:rPr lang="en-US" dirty="0" smtClean="0"/>
+              <a:t>Useful Links</a:t>
+            </a:r>
+            <a:endParaRPr lang="en-US" dirty="0"/>
+          </a:p>
+        </p:txBody>
+      </p:sp>
+      <p:sp>
+        <p:nvSpPr>
+          <p:cNvPr id="3" name="Content Placeholder 2"/>
+          <p:cNvSpPr>
+            <a:spLocks noGrp="1"/>
+          </p:cNvSpPr>
+          <p:nvPr>
+            <p:ph idx="1"/>
+          </p:nvPr>
+        </p:nvSpPr>
+        <p:spPr/>
+        <p:txBody>
+          <a:bodyPr/>
+          <a:lstStyle/>
+          <a:p>
+            <a:r>
+              <a:rPr lang="en-US" dirty="0" smtClean="0">
+                <a:hlinkClick r:id="rId2"/>
+              </a:rPr>
+              <a:t>Studio and Maven</a:t>
+            </a:r>
+          </a:p>
+          <a:p>
+            <a:pPr lvl="1"/>
+            <a:r>
+              <a:rPr lang="en-US" dirty="0" smtClean="0">
+                <a:hlinkClick r:id="rId2"/>
+              </a:rPr>
+              <a:t>http</a:t>
+            </a:r>
+            <a:r>
+              <a:rPr lang="en-US" dirty="0">
+                <a:hlinkClick r:id="rId2"/>
+              </a:rPr>
+              <a:t>://www.mulesoft.org/documentation/display/current/Studio+and+</a:t>
+            </a:r>
+            <a:r>
+              <a:rPr lang="en-US" dirty="0" smtClean="0">
+                <a:hlinkClick r:id="rId2"/>
+              </a:rPr>
+              <a:t>Maven</a:t>
+            </a:r>
+            <a:endParaRPr lang="en-US" dirty="0" smtClean="0"/>
+          </a:p>
+          <a:p>
+            <a:endParaRPr lang="en-US" dirty="0" smtClean="0"/>
+          </a:p>
+          <a:p>
+            <a:r>
+              <a:rPr lang="en-US" dirty="0" smtClean="0"/>
+              <a:t>m2eclipse</a:t>
+            </a:r>
+            <a:endParaRPr lang="en-US" dirty="0"/>
+          </a:p>
+          <a:p>
+            <a:pPr lvl="1"/>
+            <a:r>
+              <a:rPr lang="en-US" dirty="0"/>
+              <a:t>http://</a:t>
+            </a:r>
+            <a:r>
+              <a:rPr lang="en-US" dirty="0" err="1"/>
+              <a:t>eclipse.org</a:t>
+            </a:r>
+            <a:r>
+              <a:rPr lang="en-US" dirty="0"/>
+              <a:t>/m2e/download/</a:t>
+            </a:r>
+          </a:p>
+        </p:txBody>
+      </p:sp>
+      <p:sp>
+        <p:nvSpPr>
+          <p:cNvPr id="4" name="Footer Placeholder 3"/>
+          <p:cNvSpPr>
+            <a:spLocks noGrp="1"/>
+          </p:cNvSpPr>
+          <p:nvPr>
+            <p:ph type="ftr" sz="quarter" idx="10"/>
+          </p:nvPr>
+        </p:nvSpPr>
+        <p:spPr/>
+        <p:txBody>
+          <a:bodyPr/>
+          <a:lstStyle/>
+          <a:p>
+            <a:r>
+              <a:rPr lang="en-US" smtClean="0"/>
+              <a:t>All contents Copyright </a:t>
+            </a:r>
+            <a:r>
+              <a:rPr lang="en-US" smtClean="0">
+                <a:sym typeface="Symbol" pitchFamily="18" charset="2"/>
+              </a:rPr>
+              <a:t></a:t>
+            </a:r>
+            <a:r>
+              <a:rPr lang="en-US" smtClean="0"/>
+              <a:t> 2011, MuleSoft Inc.</a:t>
+            </a:r>
+            <a:endParaRPr lang="en-US"/>
+          </a:p>
+        </p:txBody>
+      </p:sp>
+    </p:spTree>
+    <p:extLst>
+      <p:ext uri="{BB962C8B-B14F-4D97-AF65-F5344CB8AC3E}">
+        <p14:creationId xmlns:p14="http://schemas.microsoft.com/office/powerpoint/2010/main" val="2473025155"/>
+      </p:ext>
+    </p:extLst>
+  </p:cSld>
+  <p:clrMapOvr>
+    <a:masterClrMapping/>
+  </p:clrMapOvr>
+</p:sld>
+</file>
+
+<file path=ppt/slides/slide9.xml><?xml version="1.0" encoding="utf-8"?>
 <p:sld xmlns:a="http://schemas.openxmlformats.org/drawingml/2006/main" xmlns:r="http://schemas.openxmlformats.org/officeDocument/2006/relationships" xmlns:p="http://schemas.openxmlformats.org/presentationml/2006/main">
   <p:cSld>
     <p:spTree>
@@ -7842,172 +8718,6 @@
       </p:par>
     </p:tnLst>
   </p:timing>
-</p:sld>
-</file>
-
-<file path=ppt/slides/slide7.xml><?xml version="1.0" encoding="utf-8"?>
-<p:sld xmlns:a="http://schemas.openxmlformats.org/drawingml/2006/main" xmlns:r="http://schemas.openxmlformats.org/officeDocument/2006/relationships" xmlns:p="http://schemas.openxmlformats.org/presentationml/2006/main">
-  <p:cSld>
-    <p:spTree>
-      <p:nvGrpSpPr>
-        <p:cNvPr id="1" name=""/>
-        <p:cNvGrpSpPr/>
-        <p:nvPr/>
-      </p:nvGrpSpPr>
-      <p:grpSpPr>
-        <a:xfrm>
-          <a:off x="0" y="0"/>
-          <a:ext cx="0" cy="0"/>
-          <a:chOff x="0" y="0"/>
-          <a:chExt cx="0" cy="0"/>
-        </a:xfrm>
-      </p:grpSpPr>
-      <p:sp>
-        <p:nvSpPr>
-          <p:cNvPr id="2" name="Title 1"/>
-          <p:cNvSpPr>
-            <a:spLocks noGrp="1"/>
-          </p:cNvSpPr>
-          <p:nvPr>
-            <p:ph type="title"/>
-          </p:nvPr>
-        </p:nvSpPr>
-        <p:spPr/>
-        <p:txBody>
-          <a:bodyPr/>
-          <a:lstStyle/>
-          <a:p>
-            <a:r>
-              <a:rPr lang="en-US" dirty="0" smtClean="0"/>
-              <a:t>Studio Maven – Lab Primer</a:t>
-            </a:r>
-            <a:endParaRPr lang="en-US" dirty="0"/>
-          </a:p>
-        </p:txBody>
-      </p:sp>
-      <p:sp>
-        <p:nvSpPr>
-          <p:cNvPr id="3" name="Content Placeholder 2"/>
-          <p:cNvSpPr>
-            <a:spLocks noGrp="1"/>
-          </p:cNvSpPr>
-          <p:nvPr>
-            <p:ph idx="1"/>
-          </p:nvPr>
-        </p:nvSpPr>
-        <p:spPr/>
-        <p:txBody>
-          <a:bodyPr/>
-          <a:lstStyle/>
-          <a:p>
-            <a:r>
-              <a:rPr lang="en-US" dirty="0" smtClean="0"/>
-              <a:t>The aim of this lab is to add Maven support to the existing Lab project</a:t>
-            </a:r>
-          </a:p>
-          <a:p>
-            <a:r>
-              <a:rPr lang="en-US" dirty="0" smtClean="0"/>
-              <a:t>Add </a:t>
-            </a:r>
-            <a:r>
-              <a:rPr lang="en-US" dirty="0" err="1" smtClean="0"/>
-              <a:t>pom.xml</a:t>
-            </a:r>
-            <a:r>
-              <a:rPr lang="en-US" dirty="0" smtClean="0"/>
-              <a:t> and include required dependencies:</a:t>
-            </a:r>
-          </a:p>
-          <a:p>
-            <a:pPr lvl="1"/>
-            <a:r>
-              <a:rPr lang="en-US" dirty="0" smtClean="0"/>
-              <a:t>activemq-all-5.5.1</a:t>
-            </a:r>
-          </a:p>
-          <a:p>
-            <a:pPr lvl="1"/>
-            <a:r>
-              <a:rPr lang="en-US" dirty="0"/>
-              <a:t>d</a:t>
-            </a:r>
-            <a:r>
-              <a:rPr lang="en-US" dirty="0" smtClean="0"/>
-              <a:t>erby-10.6.1.0</a:t>
-            </a:r>
-          </a:p>
-          <a:p>
-            <a:pPr lvl="1"/>
-            <a:r>
-              <a:rPr lang="en-US" dirty="0"/>
-              <a:t>c</a:t>
-            </a:r>
-            <a:r>
-              <a:rPr lang="en-US" dirty="0" smtClean="0"/>
-              <a:t>ommons-collections-3.2.1</a:t>
-            </a:r>
-          </a:p>
-          <a:p>
-            <a:pPr lvl="1"/>
-            <a:r>
-              <a:rPr lang="en-US" dirty="0"/>
-              <a:t>c</a:t>
-            </a:r>
-            <a:r>
-              <a:rPr lang="en-US" dirty="0" smtClean="0"/>
-              <a:t>ommonse-lang-2.4</a:t>
-            </a:r>
-          </a:p>
-          <a:p>
-            <a:pPr lvl="1"/>
-            <a:endParaRPr lang="en-US" dirty="0"/>
-          </a:p>
-        </p:txBody>
-      </p:sp>
-      <p:sp>
-        <p:nvSpPr>
-          <p:cNvPr id="4" name="Footer Placeholder 3"/>
-          <p:cNvSpPr>
-            <a:spLocks noGrp="1"/>
-          </p:cNvSpPr>
-          <p:nvPr>
-            <p:ph type="ftr" sz="quarter" idx="10"/>
-          </p:nvPr>
-        </p:nvSpPr>
-        <p:spPr/>
-        <p:txBody>
-          <a:bodyPr/>
-          <a:lstStyle/>
-          <a:p>
-            <a:r>
-              <a:rPr lang="en-US" smtClean="0"/>
-              <a:t>All contents Copyright </a:t>
-            </a:r>
-            <a:r>
-              <a:rPr lang="en-US" smtClean="0">
-                <a:sym typeface="Symbol" pitchFamily="18" charset="2"/>
-              </a:rPr>
-              <a:t></a:t>
-            </a:r>
-            <a:r>
-              <a:rPr lang="en-US" smtClean="0"/>
-              <a:t> 2011, MuleSoft Inc.</a:t>
-            </a:r>
-            <a:endParaRPr lang="en-US"/>
-          </a:p>
-        </p:txBody>
-      </p:sp>
-    </p:spTree>
-    <p:extLst>
-      <p:ext uri="{BB962C8B-B14F-4D97-AF65-F5344CB8AC3E}">
-        <p14:creationId xmlns:p14="http://schemas.microsoft.com/office/powerpoint/2010/main" val="764660959"/>
-      </p:ext>
-    </p:extLst>
-  </p:cSld>
-  <p:clrMapOvr>
-    <a:masterClrMapping/>
-  </p:clrMapOvr>
 </p:sld>
 </file>
 

</xml_diff>